<commit_message>
Updated WDS to include Availability Zones
</commit_message>
<xml_diff>
--- a/Whiteboard design session/WDS trainer presentation - Building a resilient IaaS architecture.pptx
+++ b/Whiteboard design session/WDS trainer presentation - Building a resilient IaaS architecture.pptx
@@ -242,7 +242,7 @@
           <a:p>
             <a:fld id="{D12B4A29-5F37-4DEF-BB05-EEA5E91F514E}" type="datetimeFigureOut">
               <a:rPr lang="en-US" smtClean="0"/>
-              <a:t>10/2/2018</a:t>
+              <a:t>31-Oct-18</a:t>
             </a:fld>
             <a:endParaRPr lang="en-US" dirty="0"/>
           </a:p>
@@ -26357,6 +26357,84 @@
               <a:rPr lang="en-US" dirty="0"/>
             </a:br>
             <a:endParaRPr lang="en-US" dirty="0"/>
+          </a:p>
+        </p:txBody>
+      </p:sp>
+      <p:sp>
+        <p:nvSpPr>
+          <p:cNvPr id="2" name="Rectangle 1">
+            <a:extLst>
+              <a:ext uri="{FF2B5EF4-FFF2-40B4-BE49-F238E27FC236}">
+                <a16:creationId xmlns:a16="http://schemas.microsoft.com/office/drawing/2014/main" id="{30061D15-6323-4CB6-A727-C243A2C3C21B}"/>
+              </a:ext>
+            </a:extLst>
+          </p:cNvPr>
+          <p:cNvSpPr/>
+          <p:nvPr/>
+        </p:nvSpPr>
+        <p:spPr bwMode="auto">
+          <a:xfrm>
+            <a:off x="7328263" y="4611188"/>
+            <a:ext cx="1593669" cy="209006"/>
+          </a:xfrm>
+          <a:prstGeom prst="rect">
+            <a:avLst/>
+          </a:prstGeom>
+          <a:solidFill>
+            <a:schemeClr val="tx1"/>
+          </a:solidFill>
+          <a:ln>
+            <a:noFill/>
+            <a:headEnd type="none" w="med" len="med"/>
+            <a:tailEnd type="none" w="med" len="med"/>
+          </a:ln>
+          <a:effectLst/>
+        </p:spPr>
+        <p:style>
+          <a:lnRef idx="1">
+            <a:schemeClr val="accent2"/>
+          </a:lnRef>
+          <a:fillRef idx="3">
+            <a:schemeClr val="accent2"/>
+          </a:fillRef>
+          <a:effectRef idx="2">
+            <a:schemeClr val="accent2"/>
+          </a:effectRef>
+          <a:fontRef idx="minor">
+            <a:schemeClr val="lt1"/>
+          </a:fontRef>
+        </p:style>
+        <p:txBody>
+          <a:bodyPr rot="0" spcFirstLastPara="0" vertOverflow="overflow" horzOverflow="overflow" vert="horz" wrap="square" lIns="182880" tIns="146304" rIns="182880" bIns="146304" numCol="1" spcCol="0" rtlCol="0" fromWordArt="0" anchor="ctr" anchorCtr="0" forceAA="0" compatLnSpc="1">
+            <a:prstTxWarp prst="textNoShape">
+              <a:avLst/>
+            </a:prstTxWarp>
+            <a:noAutofit/>
+          </a:bodyPr>
+          <a:lstStyle/>
+          <a:p>
+            <a:pPr algn="ctr" defTabSz="932472" fontAlgn="base">
+              <a:lnSpc>
+                <a:spcPct val="90000"/>
+              </a:lnSpc>
+              <a:spcBef>
+                <a:spcPct val="0"/>
+              </a:spcBef>
+              <a:spcAft>
+                <a:spcPct val="0"/>
+              </a:spcAft>
+            </a:pPr>
+            <a:r>
+              <a:rPr lang="en-US" sz="1050" b="1" dirty="0">
+                <a:solidFill>
+                  <a:schemeClr val="bg1"/>
+                </a:solidFill>
+                <a:latin typeface="Segoe UI" panose="020B0502040204020203" pitchFamily="34" charset="0"/>
+                <a:ea typeface="Segoe UI" panose="020B0502040204020203" pitchFamily="34" charset="0"/>
+                <a:cs typeface="Segoe UI" panose="020B0502040204020203" pitchFamily="34" charset="0"/>
+              </a:rPr>
+              <a:t>Availability Zone</a:t>
+            </a:r>
           </a:p>
         </p:txBody>
       </p:sp>
@@ -31364,15 +31442,6 @@
 </file>
 
 <file path=customXml/item1.xml><?xml version="1.0" encoding="utf-8"?>
-<?mso-contentType ?>
-<FormTemplates xmlns="http://schemas.microsoft.com/sharepoint/v3/contenttype/forms">
-  <Display>DocumentLibraryForm</Display>
-  <Edit>DocumentLibraryForm</Edit>
-  <New>DocumentLibraryForm</New>
-</FormTemplates>
-</file>
-
-<file path=customXml/item2.xml><?xml version="1.0" encoding="utf-8"?>
 <ct:contentTypeSchema xmlns:ct="http://schemas.microsoft.com/office/2006/metadata/contentType" xmlns:ma="http://schemas.microsoft.com/office/2006/metadata/properties/metaAttributes" ct:_="" ma:_="" ma:contentTypeName="Document" ma:contentTypeID="0x010100D15DFA3690A15B4081582BBCC6BEAC3E" ma:contentTypeVersion="9" ma:contentTypeDescription="Create a new document." ma:contentTypeScope="" ma:versionID="642da1784587cbe85a7fdbbe4dc36103">
   <xsd:schema xmlns:xsd="http://www.w3.org/2001/XMLSchema" xmlns:xs="http://www.w3.org/2001/XMLSchema" xmlns:p="http://schemas.microsoft.com/office/2006/metadata/properties" xmlns:ns1="http://schemas.microsoft.com/sharepoint/v3" xmlns:ns2="2023ac63-7b75-4916-a9ee-591457758eee" xmlns:ns3="d9c797ad-d7c3-4982-82b7-81352a75e4a5" targetNamespace="http://schemas.microsoft.com/office/2006/metadata/properties" ma:root="true" ma:fieldsID="91198b0246576053cc55dd2c67035a89" ns1:_="" ns2:_="" ns3:_="">
     <xsd:import namespace="http://schemas.microsoft.com/sharepoint/v3"/>
@@ -31574,6 +31643,15 @@
 </ct:contentTypeSchema>
 </file>
 
+<file path=customXml/item2.xml><?xml version="1.0" encoding="utf-8"?>
+<?mso-contentType ?>
+<FormTemplates xmlns="http://schemas.microsoft.com/sharepoint/v3/contenttype/forms">
+  <Display>DocumentLibraryForm</Display>
+  <Edit>DocumentLibraryForm</Edit>
+  <New>DocumentLibraryForm</New>
+</FormTemplates>
+</file>
+
 <file path=customXml/item3.xml><?xml version="1.0" encoding="utf-8"?>
 <p:properties xmlns:p="http://schemas.microsoft.com/office/2006/metadata/properties" xmlns:xsi="http://www.w3.org/2001/XMLSchema-instance" xmlns:pc="http://schemas.microsoft.com/office/infopath/2007/PartnerControls">
   <documentManagement>
@@ -31584,14 +31662,6 @@
 </file>
 
 <file path=customXml/itemProps1.xml><?xml version="1.0" encoding="utf-8"?>
-<ds:datastoreItem xmlns:ds="http://schemas.openxmlformats.org/officeDocument/2006/customXml" ds:itemID="{D5A22677-9165-4AB6-9580-CE94CCD209C5}">
-  <ds:schemaRefs>
-    <ds:schemaRef ds:uri="http://schemas.microsoft.com/sharepoint/v3/contenttype/forms"/>
-  </ds:schemaRefs>
-</ds:datastoreItem>
-</file>
-
-<file path=customXml/itemProps2.xml><?xml version="1.0" encoding="utf-8"?>
 <ds:datastoreItem xmlns:ds="http://schemas.openxmlformats.org/officeDocument/2006/customXml" ds:itemID="{A26E40F2-DB1A-4ED5-85D8-FAE814896E97}">
   <ds:schemaRefs>
     <ds:schemaRef ds:uri="http://schemas.microsoft.com/office/2006/metadata/contentType"/>
@@ -31607,6 +31677,14 @@
     <ds:schemaRef ds:uri="http://purl.org/dc/elements/1.1/"/>
     <ds:schemaRef ds:uri="http://purl.org/dc/terms/"/>
     <ds:schemaRef ds:uri="http://schemas.microsoft.com/internal/obd"/>
+  </ds:schemaRefs>
+</ds:datastoreItem>
+</file>
+
+<file path=customXml/itemProps2.xml><?xml version="1.0" encoding="utf-8"?>
+<ds:datastoreItem xmlns:ds="http://schemas.openxmlformats.org/officeDocument/2006/customXml" ds:itemID="{D5A22677-9165-4AB6-9580-CE94CCD209C5}">
+  <ds:schemaRefs>
+    <ds:schemaRef ds:uri="http://schemas.microsoft.com/sharepoint/v3/contenttype/forms"/>
   </ds:schemaRefs>
 </ds:datastoreItem>
 </file>

</xml_diff>

<commit_message>
November 18 MCW Updates
WDS Updates:
- Added references to Availability Zones in West US 2 for WDS
- Updated Trainer and Student Guide dates
- Updated images
- Fixed table formatting for NSGs
- Spelling and formatting fixes

HOL Updates:
- Updated Availability Sets to Availability Zones
- Updated last updated date to November 2018
- Updated WDS to include Availability Zones
- Archive Unguided HOL
</commit_message>
<xml_diff>
--- a/Whiteboard design session/WDS trainer presentation - Building a resilient IaaS architecture.pptx
+++ b/Whiteboard design session/WDS trainer presentation - Building a resilient IaaS architecture.pptx
@@ -242,7 +242,7 @@
           <a:p>
             <a:fld id="{D12B4A29-5F37-4DEF-BB05-EEA5E91F514E}" type="datetimeFigureOut">
               <a:rPr lang="en-US" smtClean="0"/>
-              <a:t>10/2/2018</a:t>
+              <a:t>31-Oct-18</a:t>
             </a:fld>
             <a:endParaRPr lang="en-US" dirty="0"/>
           </a:p>
@@ -26357,6 +26357,84 @@
               <a:rPr lang="en-US" dirty="0"/>
             </a:br>
             <a:endParaRPr lang="en-US" dirty="0"/>
+          </a:p>
+        </p:txBody>
+      </p:sp>
+      <p:sp>
+        <p:nvSpPr>
+          <p:cNvPr id="2" name="Rectangle 1">
+            <a:extLst>
+              <a:ext uri="{FF2B5EF4-FFF2-40B4-BE49-F238E27FC236}">
+                <a16:creationId xmlns:a16="http://schemas.microsoft.com/office/drawing/2014/main" id="{30061D15-6323-4CB6-A727-C243A2C3C21B}"/>
+              </a:ext>
+            </a:extLst>
+          </p:cNvPr>
+          <p:cNvSpPr/>
+          <p:nvPr/>
+        </p:nvSpPr>
+        <p:spPr bwMode="auto">
+          <a:xfrm>
+            <a:off x="7328263" y="4611188"/>
+            <a:ext cx="1593669" cy="209006"/>
+          </a:xfrm>
+          <a:prstGeom prst="rect">
+            <a:avLst/>
+          </a:prstGeom>
+          <a:solidFill>
+            <a:schemeClr val="tx1"/>
+          </a:solidFill>
+          <a:ln>
+            <a:noFill/>
+            <a:headEnd type="none" w="med" len="med"/>
+            <a:tailEnd type="none" w="med" len="med"/>
+          </a:ln>
+          <a:effectLst/>
+        </p:spPr>
+        <p:style>
+          <a:lnRef idx="1">
+            <a:schemeClr val="accent2"/>
+          </a:lnRef>
+          <a:fillRef idx="3">
+            <a:schemeClr val="accent2"/>
+          </a:fillRef>
+          <a:effectRef idx="2">
+            <a:schemeClr val="accent2"/>
+          </a:effectRef>
+          <a:fontRef idx="minor">
+            <a:schemeClr val="lt1"/>
+          </a:fontRef>
+        </p:style>
+        <p:txBody>
+          <a:bodyPr rot="0" spcFirstLastPara="0" vertOverflow="overflow" horzOverflow="overflow" vert="horz" wrap="square" lIns="182880" tIns="146304" rIns="182880" bIns="146304" numCol="1" spcCol="0" rtlCol="0" fromWordArt="0" anchor="ctr" anchorCtr="0" forceAA="0" compatLnSpc="1">
+            <a:prstTxWarp prst="textNoShape">
+              <a:avLst/>
+            </a:prstTxWarp>
+            <a:noAutofit/>
+          </a:bodyPr>
+          <a:lstStyle/>
+          <a:p>
+            <a:pPr algn="ctr" defTabSz="932472" fontAlgn="base">
+              <a:lnSpc>
+                <a:spcPct val="90000"/>
+              </a:lnSpc>
+              <a:spcBef>
+                <a:spcPct val="0"/>
+              </a:spcBef>
+              <a:spcAft>
+                <a:spcPct val="0"/>
+              </a:spcAft>
+            </a:pPr>
+            <a:r>
+              <a:rPr lang="en-US" sz="1050" b="1" dirty="0">
+                <a:solidFill>
+                  <a:schemeClr val="bg1"/>
+                </a:solidFill>
+                <a:latin typeface="Segoe UI" panose="020B0502040204020203" pitchFamily="34" charset="0"/>
+                <a:ea typeface="Segoe UI" panose="020B0502040204020203" pitchFamily="34" charset="0"/>
+                <a:cs typeface="Segoe UI" panose="020B0502040204020203" pitchFamily="34" charset="0"/>
+              </a:rPr>
+              <a:t>Availability Zone</a:t>
+            </a:r>
           </a:p>
         </p:txBody>
       </p:sp>
@@ -31364,15 +31442,6 @@
 </file>
 
 <file path=customXml/item1.xml><?xml version="1.0" encoding="utf-8"?>
-<?mso-contentType ?>
-<FormTemplates xmlns="http://schemas.microsoft.com/sharepoint/v3/contenttype/forms">
-  <Display>DocumentLibraryForm</Display>
-  <Edit>DocumentLibraryForm</Edit>
-  <New>DocumentLibraryForm</New>
-</FormTemplates>
-</file>
-
-<file path=customXml/item2.xml><?xml version="1.0" encoding="utf-8"?>
 <ct:contentTypeSchema xmlns:ct="http://schemas.microsoft.com/office/2006/metadata/contentType" xmlns:ma="http://schemas.microsoft.com/office/2006/metadata/properties/metaAttributes" ct:_="" ma:_="" ma:contentTypeName="Document" ma:contentTypeID="0x010100D15DFA3690A15B4081582BBCC6BEAC3E" ma:contentTypeVersion="9" ma:contentTypeDescription="Create a new document." ma:contentTypeScope="" ma:versionID="642da1784587cbe85a7fdbbe4dc36103">
   <xsd:schema xmlns:xsd="http://www.w3.org/2001/XMLSchema" xmlns:xs="http://www.w3.org/2001/XMLSchema" xmlns:p="http://schemas.microsoft.com/office/2006/metadata/properties" xmlns:ns1="http://schemas.microsoft.com/sharepoint/v3" xmlns:ns2="2023ac63-7b75-4916-a9ee-591457758eee" xmlns:ns3="d9c797ad-d7c3-4982-82b7-81352a75e4a5" targetNamespace="http://schemas.microsoft.com/office/2006/metadata/properties" ma:root="true" ma:fieldsID="91198b0246576053cc55dd2c67035a89" ns1:_="" ns2:_="" ns3:_="">
     <xsd:import namespace="http://schemas.microsoft.com/sharepoint/v3"/>
@@ -31574,6 +31643,15 @@
 </ct:contentTypeSchema>
 </file>
 
+<file path=customXml/item2.xml><?xml version="1.0" encoding="utf-8"?>
+<?mso-contentType ?>
+<FormTemplates xmlns="http://schemas.microsoft.com/sharepoint/v3/contenttype/forms">
+  <Display>DocumentLibraryForm</Display>
+  <Edit>DocumentLibraryForm</Edit>
+  <New>DocumentLibraryForm</New>
+</FormTemplates>
+</file>
+
 <file path=customXml/item3.xml><?xml version="1.0" encoding="utf-8"?>
 <p:properties xmlns:p="http://schemas.microsoft.com/office/2006/metadata/properties" xmlns:xsi="http://www.w3.org/2001/XMLSchema-instance" xmlns:pc="http://schemas.microsoft.com/office/infopath/2007/PartnerControls">
   <documentManagement>
@@ -31584,14 +31662,6 @@
 </file>
 
 <file path=customXml/itemProps1.xml><?xml version="1.0" encoding="utf-8"?>
-<ds:datastoreItem xmlns:ds="http://schemas.openxmlformats.org/officeDocument/2006/customXml" ds:itemID="{D5A22677-9165-4AB6-9580-CE94CCD209C5}">
-  <ds:schemaRefs>
-    <ds:schemaRef ds:uri="http://schemas.microsoft.com/sharepoint/v3/contenttype/forms"/>
-  </ds:schemaRefs>
-</ds:datastoreItem>
-</file>
-
-<file path=customXml/itemProps2.xml><?xml version="1.0" encoding="utf-8"?>
 <ds:datastoreItem xmlns:ds="http://schemas.openxmlformats.org/officeDocument/2006/customXml" ds:itemID="{A26E40F2-DB1A-4ED5-85D8-FAE814896E97}">
   <ds:schemaRefs>
     <ds:schemaRef ds:uri="http://schemas.microsoft.com/office/2006/metadata/contentType"/>
@@ -31607,6 +31677,14 @@
     <ds:schemaRef ds:uri="http://purl.org/dc/elements/1.1/"/>
     <ds:schemaRef ds:uri="http://purl.org/dc/terms/"/>
     <ds:schemaRef ds:uri="http://schemas.microsoft.com/internal/obd"/>
+  </ds:schemaRefs>
+</ds:datastoreItem>
+</file>
+
+<file path=customXml/itemProps2.xml><?xml version="1.0" encoding="utf-8"?>
+<ds:datastoreItem xmlns:ds="http://schemas.openxmlformats.org/officeDocument/2006/customXml" ds:itemID="{D5A22677-9165-4AB6-9580-CE94CCD209C5}">
+  <ds:schemaRefs>
+    <ds:schemaRef ds:uri="http://schemas.microsoft.com/sharepoint/v3/contenttype/forms"/>
   </ds:schemaRefs>
 </ds:datastoreItem>
 </file>

</xml_diff>